<commit_message>
align (1), (2)... in windows
</commit_message>
<xml_diff>
--- a/presentation/CP_and_MIP.pptx
+++ b/presentation/CP_and_MIP.pptx
@@ -31,7 +31,7 @@
       <p:regular r:id="rId14"/>
     </p:embeddedFont>
     <p:embeddedFont>
-      <p:font typeface="Oxygen" panose="020B0604020202020204" charset="0"/>
+      <p:font typeface="Oxygen" panose="02000503000000000000" pitchFamily="2" charset="0"/>
       <p:regular r:id="rId15"/>
       <p:bold r:id="rId16"/>
     </p:embeddedFont>
@@ -24608,7 +24608,7 @@
                   <a:schemeClr val="dk1"/>
                 </a:solidFill>
               </a:rPr>
-              <a:t>				(1)</a:t>
+              <a:t>					(1)</a:t>
             </a:r>
             <a:endParaRPr sz="2200" dirty="0">
               <a:solidFill>
@@ -31070,7 +31070,7 @@
                   <a:schemeClr val="dk1"/>
                 </a:solidFill>
               </a:rPr>
-              <a:t>		(2)</a:t>
+              <a:t>				(2)</a:t>
             </a:r>
             <a:endParaRPr sz="2200" dirty="0">
               <a:solidFill>
@@ -31622,7 +31622,7 @@
                   <a:schemeClr val="dk1"/>
                 </a:solidFill>
               </a:rPr>
-              <a:t>		(5)</a:t>
+              <a:t>			(5)</a:t>
             </a:r>
             <a:endParaRPr sz="2200" dirty="0">
               <a:solidFill>
@@ -31723,8 +31723,8 @@
           </a:p>
         </p:txBody>
       </p:sp>
-      <mc:AlternateContent xmlns:mc="http://schemas.openxmlformats.org/markup-compatibility/2006" xmlns:a14="http://schemas.microsoft.com/office/drawing/2010/main">
-        <mc:Choice Requires="a14">
+      <mc:AlternateContent xmlns:mc="http://schemas.openxmlformats.org/markup-compatibility/2006">
+        <mc:Choice xmlns:a14="http://schemas.microsoft.com/office/drawing/2010/main" Requires="a14">
           <p:sp>
             <p:nvSpPr>
               <p:cNvPr id="328" name="Google Shape;328;p15"/>
@@ -31885,7 +31885,23 @@
                       <a:schemeClr val="dk1"/>
                     </a:solidFill>
                   </a:rPr>
-                  <a:t>		(6)</a:t>
+                  <a:t>	</a:t>
+                </a:r>
+                <a:r>
+                  <a:rPr lang="en-US" sz="2200">
+                    <a:solidFill>
+                      <a:schemeClr val="dk1"/>
+                    </a:solidFill>
+                  </a:rPr>
+                  <a:t>			(</a:t>
+                </a:r>
+                <a:r>
+                  <a:rPr lang="en-US" sz="2200" dirty="0">
+                    <a:solidFill>
+                      <a:schemeClr val="dk1"/>
+                    </a:solidFill>
+                  </a:rPr>
+                  <a:t>6)</a:t>
                 </a:r>
                 <a:endParaRPr sz="2200" dirty="0">
                   <a:solidFill>
@@ -31896,7 +31912,7 @@
             </p:txBody>
           </p:sp>
         </mc:Choice>
-        <mc:Fallback xmlns="">
+        <mc:Fallback>
           <p:sp>
             <p:nvSpPr>
               <p:cNvPr id="328" name="Google Shape;328;p15"/>
@@ -55438,8 +55454,8 @@
           </p:sp>
         </mc:Fallback>
       </mc:AlternateContent>
-      <mc:AlternateContent xmlns:mc="http://schemas.openxmlformats.org/markup-compatibility/2006">
-        <mc:Choice xmlns:a14="http://schemas.microsoft.com/office/drawing/2010/main" Requires="a14">
+      <mc:AlternateContent xmlns:mc="http://schemas.openxmlformats.org/markup-compatibility/2006" xmlns:a14="http://schemas.microsoft.com/office/drawing/2010/main">
+        <mc:Choice Requires="a14">
           <p:sp>
             <p:nvSpPr>
               <p:cNvPr id="82" name="Google Shape;328;p15">
@@ -55838,7 +55854,7 @@
             </p:txBody>
           </p:sp>
         </mc:Choice>
-        <mc:Fallback>
+        <mc:Fallback xmlns="">
           <p:sp>
             <p:nvSpPr>
               <p:cNvPr id="82" name="Google Shape;328;p15">

</xml_diff>